<commit_message>
update materials, mostly work on day 1 slides
</commit_message>
<xml_diff>
--- a/day4/R Workshop Day 4 Slides.pptx
+++ b/day4/R Workshop Day 4 Slides.pptx
@@ -5,10 +5,10 @@
     <p:sldMasterId id="2147483648" r:id="rId1"/>
   </p:sldMasterIdLst>
   <p:notesMasterIdLst>
-    <p:notesMasterId r:id="rId11"/>
+    <p:notesMasterId r:id="rId12"/>
   </p:notesMasterIdLst>
   <p:handoutMasterIdLst>
-    <p:handoutMasterId r:id="rId12"/>
+    <p:handoutMasterId r:id="rId13"/>
   </p:handoutMasterIdLst>
   <p:sldIdLst>
     <p:sldId id="260" r:id="rId2"/>
@@ -19,7 +19,8 @@
     <p:sldId id="335" r:id="rId7"/>
     <p:sldId id="319" r:id="rId8"/>
     <p:sldId id="334" r:id="rId9"/>
-    <p:sldId id="301" r:id="rId10"/>
+    <p:sldId id="336" r:id="rId10"/>
+    <p:sldId id="301" r:id="rId11"/>
   </p:sldIdLst>
   <p:sldSz cx="9144000" cy="6858000" type="screen4x3"/>
   <p:notesSz cx="6858000" cy="9144000"/>
@@ -131,6 +132,7 @@
             <p14:sldId id="335"/>
             <p14:sldId id="319"/>
             <p14:sldId id="334"/>
+            <p14:sldId id="336"/>
             <p14:sldId id="301"/>
           </p14:sldIdLst>
         </p14:section>
@@ -4397,6 +4399,174 @@
 </p:sld>
 </file>
 
+<file path=ppt/slides/slide10.xml><?xml version="1.0" encoding="utf-8"?>
+<p:sld xmlns:a="http://schemas.openxmlformats.org/drawingml/2006/main" xmlns:r="http://schemas.openxmlformats.org/officeDocument/2006/relationships" xmlns:p="http://schemas.openxmlformats.org/presentationml/2006/main">
+  <p:cSld>
+    <p:spTree>
+      <p:nvGrpSpPr>
+        <p:cNvPr id="1" name=""/>
+        <p:cNvGrpSpPr/>
+        <p:nvPr/>
+      </p:nvGrpSpPr>
+      <p:grpSpPr>
+        <a:xfrm>
+          <a:off x="0" y="0"/>
+          <a:ext cx="0" cy="0"/>
+          <a:chOff x="0" y="0"/>
+          <a:chExt cx="0" cy="0"/>
+        </a:xfrm>
+      </p:grpSpPr>
+      <p:sp>
+        <p:nvSpPr>
+          <p:cNvPr id="2" name="Title 2">
+            <a:extLst>
+              <a:ext uri="{FF2B5EF4-FFF2-40B4-BE49-F238E27FC236}">
+                <a16:creationId xmlns:a16="http://schemas.microsoft.com/office/drawing/2014/main" id="{12BEE06C-3CB4-1A31-1F99-81886307D619}"/>
+              </a:ext>
+            </a:extLst>
+          </p:cNvPr>
+          <p:cNvSpPr txBox="1">
+            <a:spLocks/>
+          </p:cNvSpPr>
+          <p:nvPr/>
+        </p:nvSpPr>
+        <p:spPr>
+          <a:xfrm>
+            <a:off x="429870" y="306380"/>
+            <a:ext cx="7914030" cy="1587733"/>
+          </a:xfrm>
+          <a:prstGeom prst="rect">
+            <a:avLst/>
+          </a:prstGeom>
+        </p:spPr>
+        <p:txBody>
+          <a:bodyPr>
+            <a:noAutofit/>
+          </a:bodyPr>
+          <a:lstStyle>
+            <a:lvl1pPr algn="l" defTabSz="342991" rtl="0" eaLnBrk="1" latinLnBrk="0" hangingPunct="1">
+              <a:spcBef>
+                <a:spcPct val="0"/>
+              </a:spcBef>
+              <a:buNone/>
+              <a:defRPr sz="2701" b="1" i="0" kern="1200">
+                <a:solidFill>
+                  <a:srgbClr val="002D50"/>
+                </a:solidFill>
+                <a:latin typeface="Helvetica Neue"/>
+                <a:ea typeface="+mj-ea"/>
+                <a:cs typeface="Helvetica Neue"/>
+              </a:defRPr>
+            </a:lvl1pPr>
+          </a:lstStyle>
+          <a:p>
+            <a:r>
+              <a:rPr lang="en-US" sz="3200" dirty="0"/>
+              <a:t>Thank you!</a:t>
+            </a:r>
+          </a:p>
+          <a:p>
+            <a:endParaRPr lang="en-US" sz="3200" dirty="0"/>
+          </a:p>
+          <a:p>
+            <a:r>
+              <a:rPr lang="en-US" sz="3200" dirty="0"/>
+              <a:t>Please stay in touch.</a:t>
+            </a:r>
+          </a:p>
+          <a:p>
+            <a:endParaRPr lang="en-US" sz="3200" dirty="0"/>
+          </a:p>
+          <a:p>
+            <a:endParaRPr lang="en-US" sz="1800" b="0" dirty="0"/>
+          </a:p>
+          <a:p>
+            <a:endParaRPr lang="en-US" sz="1800" b="0" dirty="0"/>
+          </a:p>
+          <a:p>
+            <a:endParaRPr lang="en-US" sz="1800" b="0" dirty="0"/>
+          </a:p>
+          <a:p>
+            <a:endParaRPr lang="en-US" sz="1800" b="0" dirty="0"/>
+          </a:p>
+          <a:p>
+            <a:endParaRPr lang="en-US" sz="1800" b="0" dirty="0"/>
+          </a:p>
+          <a:p>
+            <a:endParaRPr lang="en-US" sz="1800" b="0" dirty="0"/>
+          </a:p>
+          <a:p>
+            <a:endParaRPr lang="en-US" sz="1800" b="0" dirty="0"/>
+          </a:p>
+          <a:p>
+            <a:endParaRPr lang="en-US" sz="1800" b="0" dirty="0"/>
+          </a:p>
+          <a:p>
+            <a:r>
+              <a:rPr lang="en-US" sz="1600" b="0" dirty="0"/>
+              <a:t>Lecture and course material adapted from Intro to R materials created by Alex Douglas, available online </a:t>
+            </a:r>
+            <a:r>
+              <a:rPr lang="en-US" sz="1600" b="0" dirty="0">
+                <a:hlinkClick r:id="rId2"/>
+              </a:rPr>
+              <a:t>here</a:t>
+            </a:r>
+            <a:r>
+              <a:rPr lang="en-US" sz="1600" b="0" dirty="0"/>
+              <a:t>, with corresponding free online textbook.</a:t>
+            </a:r>
+          </a:p>
+          <a:p>
+            <a:endParaRPr lang="en-US" sz="1800" b="0" dirty="0"/>
+          </a:p>
+        </p:txBody>
+      </p:sp>
+      <p:sp>
+        <p:nvSpPr>
+          <p:cNvPr id="3" name="TextBox 2">
+            <a:extLst>
+              <a:ext uri="{FF2B5EF4-FFF2-40B4-BE49-F238E27FC236}">
+                <a16:creationId xmlns:a16="http://schemas.microsoft.com/office/drawing/2014/main" id="{90953270-FC82-8F69-DD7E-DA9BB724AB36}"/>
+              </a:ext>
+            </a:extLst>
+          </p:cNvPr>
+          <p:cNvSpPr txBox="1"/>
+          <p:nvPr/>
+        </p:nvSpPr>
+        <p:spPr>
+          <a:xfrm>
+            <a:off x="930729" y="832757"/>
+            <a:ext cx="184731" cy="369332"/>
+          </a:xfrm>
+          <a:prstGeom prst="rect">
+            <a:avLst/>
+          </a:prstGeom>
+          <a:noFill/>
+        </p:spPr>
+        <p:txBody>
+          <a:bodyPr wrap="none" rtlCol="0">
+            <a:spAutoFit/>
+          </a:bodyPr>
+          <a:lstStyle/>
+          <a:p>
+            <a:endParaRPr lang="en-US" dirty="0"/>
+          </a:p>
+        </p:txBody>
+      </p:sp>
+    </p:spTree>
+    <p:extLst>
+      <p:ext uri="{BB962C8B-B14F-4D97-AF65-F5344CB8AC3E}">
+        <p14:creationId xmlns:p14="http://schemas.microsoft.com/office/powerpoint/2010/main" val="1064813303"/>
+      </p:ext>
+    </p:extLst>
+  </p:cSld>
+  <p:clrMapOvr>
+    <a:masterClrMapping/>
+  </p:clrMapOvr>
+</p:sld>
+</file>
+
 <file path=ppt/slides/slide2.xml><?xml version="1.0" encoding="utf-8"?>
 <p:sld xmlns:a="http://schemas.openxmlformats.org/drawingml/2006/main" xmlns:r="http://schemas.openxmlformats.org/officeDocument/2006/relationships" xmlns:p="http://schemas.openxmlformats.org/presentationml/2006/main">
   <p:cSld>
@@ -5218,8 +5388,8 @@
         </p:nvSpPr>
         <p:spPr>
           <a:xfrm>
-            <a:off x="429870" y="306380"/>
-            <a:ext cx="7914030" cy="1587733"/>
+            <a:off x="429870" y="306381"/>
+            <a:ext cx="8714130" cy="1143000"/>
           </a:xfrm>
           <a:prstGeom prst="rect">
             <a:avLst/>
@@ -5248,63 +5418,22 @@
           <a:p>
             <a:r>
               <a:rPr lang="en-US" sz="3200" dirty="0"/>
-              <a:t>Thank you!</a:t>
-            </a:r>
-          </a:p>
-          <a:p>
-            <a:endParaRPr lang="en-US" sz="3200" dirty="0"/>
+              <a:t>How to get good at R </a:t>
+            </a:r>
           </a:p>
           <a:p>
             <a:r>
               <a:rPr lang="en-US" sz="3200" dirty="0"/>
-              <a:t>Please stay in touch.</a:t>
-            </a:r>
-          </a:p>
-          <a:p>
-            <a:endParaRPr lang="en-US" sz="3200" dirty="0"/>
-          </a:p>
-          <a:p>
-            <a:endParaRPr lang="en-US" sz="1800" b="0" dirty="0"/>
-          </a:p>
-          <a:p>
-            <a:endParaRPr lang="en-US" sz="1800" b="0" dirty="0"/>
-          </a:p>
-          <a:p>
-            <a:endParaRPr lang="en-US" sz="1800" b="0" dirty="0"/>
-          </a:p>
-          <a:p>
-            <a:endParaRPr lang="en-US" sz="1800" b="0" dirty="0"/>
-          </a:p>
-          <a:p>
-            <a:endParaRPr lang="en-US" sz="1800" b="0" dirty="0"/>
-          </a:p>
-          <a:p>
-            <a:endParaRPr lang="en-US" sz="1800" b="0" dirty="0"/>
-          </a:p>
-          <a:p>
-            <a:endParaRPr lang="en-US" sz="1800" b="0" dirty="0"/>
-          </a:p>
-          <a:p>
-            <a:endParaRPr lang="en-US" sz="1800" b="0" dirty="0"/>
-          </a:p>
-          <a:p>
-            <a:r>
-              <a:rPr lang="en-US" sz="1600" b="0" dirty="0"/>
-              <a:t>Lecture and course material adapted from Intro to R materials created by Alex Douglas, available online </a:t>
-            </a:r>
-            <a:r>
-              <a:rPr lang="en-US" sz="1600" b="0" dirty="0">
-                <a:hlinkClick r:id="rId2"/>
-              </a:rPr>
-              <a:t>here</a:t>
-            </a:r>
-            <a:r>
-              <a:rPr lang="en-US" sz="1600" b="0" dirty="0"/>
-              <a:t>, with corresponding free online textbook.</a:t>
-            </a:r>
-          </a:p>
-          <a:p>
-            <a:endParaRPr lang="en-US" sz="1800" b="0" dirty="0"/>
+              <a:t>(or python, or SQL, </a:t>
+            </a:r>
+            <a:r>
+              <a:rPr lang="en-US" sz="3200" dirty="0" err="1"/>
+              <a:t>github</a:t>
+            </a:r>
+            <a:r>
+              <a:rPr lang="en-US" sz="3200" dirty="0"/>
+              <a:t>, or…)</a:t>
+            </a:r>
           </a:p>
         </p:txBody>
       </p:sp>
@@ -5313,7 +5442,7 @@
           <p:cNvPr id="3" name="TextBox 2">
             <a:extLst>
               <a:ext uri="{FF2B5EF4-FFF2-40B4-BE49-F238E27FC236}">
-                <a16:creationId xmlns:a16="http://schemas.microsoft.com/office/drawing/2014/main" id="{90953270-FC82-8F69-DD7E-DA9BB724AB36}"/>
+                <a16:creationId xmlns:a16="http://schemas.microsoft.com/office/drawing/2014/main" id="{6FCDE2E2-BE58-98DF-E6DF-D5CDACFFECFD}"/>
               </a:ext>
             </a:extLst>
           </p:cNvPr>
@@ -5322,8 +5451,8 @@
         </p:nvSpPr>
         <p:spPr>
           <a:xfrm>
-            <a:off x="930729" y="832757"/>
-            <a:ext cx="184731" cy="369332"/>
+            <a:off x="429870" y="1616528"/>
+            <a:ext cx="8463407" cy="3693319"/>
           </a:xfrm>
           <a:prstGeom prst="rect">
             <a:avLst/>
@@ -5336,14 +5465,90 @@
           </a:bodyPr>
           <a:lstStyle/>
           <a:p>
-            <a:endParaRPr lang="en-US" dirty="0"/>
+            <a:pPr marL="457200" indent="-457200">
+              <a:buFont typeface="Arial" panose="020B0604020202020204" pitchFamily="34" charset="0"/>
+              <a:buChar char="•"/>
+            </a:pPr>
+            <a:r>
+              <a:rPr lang="en-US" sz="2600" dirty="0"/>
+              <a:t>Use R, and use it often</a:t>
+            </a:r>
+          </a:p>
+          <a:p>
+            <a:pPr marL="914400" lvl="1" indent="-457200">
+              <a:buFont typeface="Arial" panose="020B0604020202020204" pitchFamily="34" charset="0"/>
+              <a:buChar char="•"/>
+            </a:pPr>
+            <a:r>
+              <a:rPr lang="en-US" sz="2600" dirty="0"/>
+              <a:t>Use R when you could use Excel, even if it takes longer</a:t>
+            </a:r>
+          </a:p>
+          <a:p>
+            <a:pPr marL="914400" lvl="1" indent="-457200">
+              <a:buFont typeface="Arial" panose="020B0604020202020204" pitchFamily="34" charset="0"/>
+              <a:buChar char="•"/>
+            </a:pPr>
+            <a:r>
+              <a:rPr lang="en-US" sz="2600" dirty="0"/>
+              <a:t>Consider a fun personal project</a:t>
+            </a:r>
+          </a:p>
+          <a:p>
+            <a:pPr marL="914400" lvl="1" indent="-457200">
+              <a:buFont typeface="Arial" panose="020B0604020202020204" pitchFamily="34" charset="0"/>
+              <a:buChar char="•"/>
+            </a:pPr>
+            <a:endParaRPr lang="en-US" sz="2600" dirty="0"/>
+          </a:p>
+          <a:p>
+            <a:pPr marL="457200" indent="-457200">
+              <a:buFont typeface="Arial" panose="020B0604020202020204" pitchFamily="34" charset="0"/>
+              <a:buChar char="•"/>
+            </a:pPr>
+            <a:r>
+              <a:rPr lang="en-US" sz="2600" dirty="0"/>
+              <a:t>Follow others on </a:t>
+            </a:r>
+            <a:r>
+              <a:rPr lang="en-US" sz="2600" dirty="0" err="1"/>
+              <a:t>github</a:t>
+            </a:r>
+            <a:r>
+              <a:rPr lang="en-US" sz="2600" dirty="0"/>
+              <a:t> and check out what they’re doing</a:t>
+            </a:r>
+          </a:p>
+          <a:p>
+            <a:pPr marL="457200" indent="-457200">
+              <a:buFont typeface="Arial" panose="020B0604020202020204" pitchFamily="34" charset="0"/>
+              <a:buChar char="•"/>
+            </a:pPr>
+            <a:endParaRPr lang="en-US" sz="2600" dirty="0"/>
+          </a:p>
+          <a:p>
+            <a:pPr marL="457200" indent="-457200">
+              <a:buFont typeface="Arial" panose="020B0604020202020204" pitchFamily="34" charset="0"/>
+              <a:buChar char="•"/>
+            </a:pPr>
+            <a:endParaRPr lang="en-US" sz="2600" dirty="0"/>
+          </a:p>
+          <a:p>
+            <a:endParaRPr lang="en-US" sz="2600" dirty="0"/>
+          </a:p>
+          <a:p>
+            <a:pPr marL="914400" lvl="1" indent="-457200">
+              <a:buFont typeface="Arial" panose="020B0604020202020204" pitchFamily="34" charset="0"/>
+              <a:buChar char="•"/>
+            </a:pPr>
+            <a:endParaRPr lang="en-US" sz="2600" dirty="0"/>
           </a:p>
         </p:txBody>
       </p:sp>
     </p:spTree>
     <p:extLst>
       <p:ext uri="{BB962C8B-B14F-4D97-AF65-F5344CB8AC3E}">
-        <p14:creationId xmlns:p14="http://schemas.microsoft.com/office/powerpoint/2010/main" val="1064813303"/>
+        <p14:creationId xmlns:p14="http://schemas.microsoft.com/office/powerpoint/2010/main" val="3555015706"/>
       </p:ext>
     </p:extLst>
   </p:cSld>

</xml_diff>